<commit_message>
Fix Lecture 4 Typos
</commit_message>
<xml_diff>
--- a/Lecture 4.pptx
+++ b/Lecture 4.pptx
@@ -6684,7 +6684,7 @@
             </a:r>
             <a:r>
               <a:rPr lang="en-US" dirty="0"/>
-              <a:t>” KEYWORK</a:t>
+              <a:t>” KEYWORD</a:t>
             </a:r>
           </a:p>
         </p:txBody>
@@ -6857,7 +6857,7 @@
             </a:r>
             <a:r>
               <a:rPr lang="en-US" dirty="0"/>
-              <a:t>” KEYWORK</a:t>
+              <a:t>” KEYWORD</a:t>
             </a:r>
           </a:p>
         </p:txBody>
@@ -7836,8 +7836,8 @@
         </p:blipFill>
         <p:spPr>
           <a:xfrm>
-            <a:off x="2679032" y="2438844"/>
-            <a:ext cx="4989094" cy="1465639"/>
+            <a:off x="1547082" y="2297937"/>
+            <a:ext cx="6577587" cy="1932288"/>
           </a:xfrm>
           <a:prstGeom prst="rect">
             <a:avLst/>
@@ -9073,8 +9073,8 @@
         </p:blipFill>
         <p:spPr>
           <a:xfrm>
-            <a:off x="2911445" y="1780902"/>
-            <a:ext cx="5506841" cy="4504711"/>
+            <a:off x="854439" y="98228"/>
+            <a:ext cx="7563847" cy="6187385"/>
           </a:xfrm>
           <a:prstGeom prst="rect">
             <a:avLst/>

</xml_diff>